<commit_message>
1. Fixing file paths and ignoring unnecessary files 2.optimize the testbench logic 3.fixed: wrong input of write_reg in CPU_core.v 4.changed: the logic of fetching reg[0] 5.fixed: [31:0]next_PC_reg in PC_adder.v 6.Changed:  initial  PC reg  to 0 in PC_register.v; initial Memory in  RAM.v
</commit_message>
<xml_diff>
--- a/32bit_RiscV_desidn/Risc-V_CPU.pptx
+++ b/32bit_RiscV_desidn/Risc-V_CPU.pptx
@@ -7,6 +7,7 @@
   <p:sldIdLst>
     <p:sldId id="261" r:id="rId2"/>
     <p:sldId id="262" r:id="rId3"/>
+    <p:sldId id="263" r:id="rId4"/>
   </p:sldIdLst>
   <p:sldSz cx="12192000" cy="6858000"/>
   <p:notesSz cx="6858000" cy="9144000"/>
@@ -117,8 +118,8 @@
 <pc:chgInfo xmlns:a="http://schemas.openxmlformats.org/drawingml/2006/main" xmlns:r="http://schemas.openxmlformats.org/officeDocument/2006/relationships" xmlns:ac="http://schemas.microsoft.com/office/drawing/2013/main/command" xmlns:pc="http://schemas.microsoft.com/office/powerpoint/2013/main/command">
   <pc:docChgLst>
     <pc:chgData name="Laboratories Aperture Science" userId="4ef7ff3058e5cb20" providerId="LiveId" clId="{75C87B12-65F8-4F4F-BEF0-CFEE6D12BA6B}"/>
-    <pc:docChg chg="custSel addSld delSld modSld">
-      <pc:chgData name="Laboratories Aperture Science" userId="4ef7ff3058e5cb20" providerId="LiveId" clId="{75C87B12-65F8-4F4F-BEF0-CFEE6D12BA6B}" dt="2024-04-15T05:45:44.547" v="12" actId="1076"/>
+    <pc:docChg chg="undo custSel addSld delSld modSld">
+      <pc:chgData name="Laboratories Aperture Science" userId="4ef7ff3058e5cb20" providerId="LiveId" clId="{75C87B12-65F8-4F4F-BEF0-CFEE6D12BA6B}" dt="2024-05-06T12:08:36.498" v="168" actId="11529"/>
       <pc:docMkLst>
         <pc:docMk/>
       </pc:docMkLst>
@@ -173,6 +174,325 @@
           </ac:picMkLst>
         </pc:picChg>
       </pc:sldChg>
+      <pc:sldChg chg="addSp delSp modSp new mod">
+        <pc:chgData name="Laboratories Aperture Science" userId="4ef7ff3058e5cb20" providerId="LiveId" clId="{75C87B12-65F8-4F4F-BEF0-CFEE6D12BA6B}" dt="2024-05-06T12:08:36.498" v="168" actId="11529"/>
+        <pc:sldMkLst>
+          <pc:docMk/>
+          <pc:sldMk cId="2452836750" sldId="263"/>
+        </pc:sldMkLst>
+        <pc:spChg chg="add mod">
+          <ac:chgData name="Laboratories Aperture Science" userId="4ef7ff3058e5cb20" providerId="LiveId" clId="{75C87B12-65F8-4F4F-BEF0-CFEE6D12BA6B}" dt="2024-05-06T11:23:25.208" v="14"/>
+          <ac:spMkLst>
+            <pc:docMk/>
+            <pc:sldMk cId="2452836750" sldId="263"/>
+            <ac:spMk id="2" creationId="{5C252725-6A29-BB2F-B72C-BB0C1A923CA7}"/>
+          </ac:spMkLst>
+        </pc:spChg>
+        <pc:spChg chg="add mod">
+          <ac:chgData name="Laboratories Aperture Science" userId="4ef7ff3058e5cb20" providerId="LiveId" clId="{75C87B12-65F8-4F4F-BEF0-CFEE6D12BA6B}" dt="2024-05-06T11:51:28.204" v="66" actId="1076"/>
+          <ac:spMkLst>
+            <pc:docMk/>
+            <pc:sldMk cId="2452836750" sldId="263"/>
+            <ac:spMk id="3" creationId="{E24AC7EF-02F7-9266-1F1D-786C7E8C9F97}"/>
+          </ac:spMkLst>
+        </pc:spChg>
+        <pc:spChg chg="add mod">
+          <ac:chgData name="Laboratories Aperture Science" userId="4ef7ff3058e5cb20" providerId="LiveId" clId="{75C87B12-65F8-4F4F-BEF0-CFEE6D12BA6B}" dt="2024-05-06T11:51:34.569" v="68" actId="1076"/>
+          <ac:spMkLst>
+            <pc:docMk/>
+            <pc:sldMk cId="2452836750" sldId="263"/>
+            <ac:spMk id="4" creationId="{6045BE78-AE73-93C4-FF21-0AAE14246AE1}"/>
+          </ac:spMkLst>
+        </pc:spChg>
+        <pc:spChg chg="add mod">
+          <ac:chgData name="Laboratories Aperture Science" userId="4ef7ff3058e5cb20" providerId="LiveId" clId="{75C87B12-65F8-4F4F-BEF0-CFEE6D12BA6B}" dt="2024-05-06T11:51:40.640" v="70" actId="1076"/>
+          <ac:spMkLst>
+            <pc:docMk/>
+            <pc:sldMk cId="2452836750" sldId="263"/>
+            <ac:spMk id="5" creationId="{97B13F7F-5991-7BAE-885A-0CD5787A8F91}"/>
+          </ac:spMkLst>
+        </pc:spChg>
+        <pc:spChg chg="add mod">
+          <ac:chgData name="Laboratories Aperture Science" userId="4ef7ff3058e5cb20" providerId="LiveId" clId="{75C87B12-65F8-4F4F-BEF0-CFEE6D12BA6B}" dt="2024-05-06T11:51:37.751" v="69" actId="1076"/>
+          <ac:spMkLst>
+            <pc:docMk/>
+            <pc:sldMk cId="2452836750" sldId="263"/>
+            <ac:spMk id="6" creationId="{E048D397-6937-2DF2-F802-C7D376EA6D9B}"/>
+          </ac:spMkLst>
+        </pc:spChg>
+        <pc:spChg chg="add mod">
+          <ac:chgData name="Laboratories Aperture Science" userId="4ef7ff3058e5cb20" providerId="LiveId" clId="{75C87B12-65F8-4F4F-BEF0-CFEE6D12BA6B}" dt="2024-05-06T11:51:47.572" v="72" actId="1076"/>
+          <ac:spMkLst>
+            <pc:docMk/>
+            <pc:sldMk cId="2452836750" sldId="263"/>
+            <ac:spMk id="7" creationId="{3B261C0B-B8AD-A391-2946-96D5A505FFBA}"/>
+          </ac:spMkLst>
+        </pc:spChg>
+        <pc:spChg chg="add mod">
+          <ac:chgData name="Laboratories Aperture Science" userId="4ef7ff3058e5cb20" providerId="LiveId" clId="{75C87B12-65F8-4F4F-BEF0-CFEE6D12BA6B}" dt="2024-05-06T11:51:44.431" v="71" actId="1076"/>
+          <ac:spMkLst>
+            <pc:docMk/>
+            <pc:sldMk cId="2452836750" sldId="263"/>
+            <ac:spMk id="8" creationId="{E4E8CBAD-9FDD-7234-F666-F11804FC900F}"/>
+          </ac:spMkLst>
+        </pc:spChg>
+        <pc:spChg chg="add mod">
+          <ac:chgData name="Laboratories Aperture Science" userId="4ef7ff3058e5cb20" providerId="LiveId" clId="{75C87B12-65F8-4F4F-BEF0-CFEE6D12BA6B}" dt="2024-05-06T11:51:53.929" v="74" actId="1076"/>
+          <ac:spMkLst>
+            <pc:docMk/>
+            <pc:sldMk cId="2452836750" sldId="263"/>
+            <ac:spMk id="9" creationId="{03AAF6B6-59D7-7F43-4548-59BF65FCFD69}"/>
+          </ac:spMkLst>
+        </pc:spChg>
+        <pc:spChg chg="add mod">
+          <ac:chgData name="Laboratories Aperture Science" userId="4ef7ff3058e5cb20" providerId="LiveId" clId="{75C87B12-65F8-4F4F-BEF0-CFEE6D12BA6B}" dt="2024-05-06T11:58:41.685" v="131" actId="14100"/>
+          <ac:spMkLst>
+            <pc:docMk/>
+            <pc:sldMk cId="2452836750" sldId="263"/>
+            <ac:spMk id="10" creationId="{B7C9BB1E-2A2B-C4B1-4BB7-508FE73AEFC0}"/>
+          </ac:spMkLst>
+        </pc:spChg>
+        <pc:spChg chg="add del mod">
+          <ac:chgData name="Laboratories Aperture Science" userId="4ef7ff3058e5cb20" providerId="LiveId" clId="{75C87B12-65F8-4F4F-BEF0-CFEE6D12BA6B}" dt="2024-05-06T11:48:03.796" v="54" actId="478"/>
+          <ac:spMkLst>
+            <pc:docMk/>
+            <pc:sldMk cId="2452836750" sldId="263"/>
+            <ac:spMk id="11" creationId="{289890DC-FE5A-1552-1A64-7BC77987EBC2}"/>
+          </ac:spMkLst>
+        </pc:spChg>
+        <pc:spChg chg="add mod">
+          <ac:chgData name="Laboratories Aperture Science" userId="4ef7ff3058e5cb20" providerId="LiveId" clId="{75C87B12-65F8-4F4F-BEF0-CFEE6D12BA6B}" dt="2024-05-06T11:51:56.773" v="75" actId="1076"/>
+          <ac:spMkLst>
+            <pc:docMk/>
+            <pc:sldMk cId="2452836750" sldId="263"/>
+            <ac:spMk id="12" creationId="{C2DEC991-CA6F-0ECB-E9F2-D24C43B5707A}"/>
+          </ac:spMkLst>
+        </pc:spChg>
+        <pc:spChg chg="add mod">
+          <ac:chgData name="Laboratories Aperture Science" userId="4ef7ff3058e5cb20" providerId="LiveId" clId="{75C87B12-65F8-4F4F-BEF0-CFEE6D12BA6B}" dt="2024-05-06T11:53:34.320" v="89" actId="207"/>
+          <ac:spMkLst>
+            <pc:docMk/>
+            <pc:sldMk cId="2452836750" sldId="263"/>
+            <ac:spMk id="22" creationId="{79560375-6E4B-C687-B622-7EA19ECCA612}"/>
+          </ac:spMkLst>
+        </pc:spChg>
+        <pc:spChg chg="add mod">
+          <ac:chgData name="Laboratories Aperture Science" userId="4ef7ff3058e5cb20" providerId="LiveId" clId="{75C87B12-65F8-4F4F-BEF0-CFEE6D12BA6B}" dt="2024-05-06T11:58:08.655" v="126" actId="688"/>
+          <ac:spMkLst>
+            <pc:docMk/>
+            <pc:sldMk cId="2452836750" sldId="263"/>
+            <ac:spMk id="23" creationId="{B01BC00B-5339-22C4-CC22-898D424936D1}"/>
+          </ac:spMkLst>
+        </pc:spChg>
+        <pc:spChg chg="add mod">
+          <ac:chgData name="Laboratories Aperture Science" userId="4ef7ff3058e5cb20" providerId="LiveId" clId="{75C87B12-65F8-4F4F-BEF0-CFEE6D12BA6B}" dt="2024-05-06T11:55:52.661" v="98" actId="1076"/>
+          <ac:spMkLst>
+            <pc:docMk/>
+            <pc:sldMk cId="2452836750" sldId="263"/>
+            <ac:spMk id="24" creationId="{4EFC7B20-D2E6-2470-BF36-597ACCE861F1}"/>
+          </ac:spMkLst>
+        </pc:spChg>
+        <pc:spChg chg="add mod">
+          <ac:chgData name="Laboratories Aperture Science" userId="4ef7ff3058e5cb20" providerId="LiveId" clId="{75C87B12-65F8-4F4F-BEF0-CFEE6D12BA6B}" dt="2024-05-06T11:58:30.783" v="130" actId="1076"/>
+          <ac:spMkLst>
+            <pc:docMk/>
+            <pc:sldMk cId="2452836750" sldId="263"/>
+            <ac:spMk id="25" creationId="{6BB7B779-4487-CE26-1C67-1729F239376B}"/>
+          </ac:spMkLst>
+        </pc:spChg>
+        <pc:spChg chg="add mod">
+          <ac:chgData name="Laboratories Aperture Science" userId="4ef7ff3058e5cb20" providerId="LiveId" clId="{75C87B12-65F8-4F4F-BEF0-CFEE6D12BA6B}" dt="2024-05-06T11:58:24.834" v="129" actId="14100"/>
+          <ac:spMkLst>
+            <pc:docMk/>
+            <pc:sldMk cId="2452836750" sldId="263"/>
+            <ac:spMk id="26" creationId="{96B89678-1657-8836-C667-C3058245A1DC}"/>
+          </ac:spMkLst>
+        </pc:spChg>
+        <pc:spChg chg="add mod">
+          <ac:chgData name="Laboratories Aperture Science" userId="4ef7ff3058e5cb20" providerId="LiveId" clId="{75C87B12-65F8-4F4F-BEF0-CFEE6D12BA6B}" dt="2024-05-06T11:56:56.423" v="110" actId="1076"/>
+          <ac:spMkLst>
+            <pc:docMk/>
+            <pc:sldMk cId="2452836750" sldId="263"/>
+            <ac:spMk id="27" creationId="{5751D18E-85D4-18AD-546C-F08310B50DCC}"/>
+          </ac:spMkLst>
+        </pc:spChg>
+        <pc:spChg chg="add mod">
+          <ac:chgData name="Laboratories Aperture Science" userId="4ef7ff3058e5cb20" providerId="LiveId" clId="{75C87B12-65F8-4F4F-BEF0-CFEE6D12BA6B}" dt="2024-05-06T11:57:03.977" v="114" actId="1076"/>
+          <ac:spMkLst>
+            <pc:docMk/>
+            <pc:sldMk cId="2452836750" sldId="263"/>
+            <ac:spMk id="28" creationId="{0DA74857-05D3-CCAB-6877-D1A3303D5FE2}"/>
+          </ac:spMkLst>
+        </pc:spChg>
+        <pc:spChg chg="add mod">
+          <ac:chgData name="Laboratories Aperture Science" userId="4ef7ff3058e5cb20" providerId="LiveId" clId="{75C87B12-65F8-4F4F-BEF0-CFEE6D12BA6B}" dt="2024-05-06T11:58:19.818" v="128" actId="688"/>
+          <ac:spMkLst>
+            <pc:docMk/>
+            <pc:sldMk cId="2452836750" sldId="263"/>
+            <ac:spMk id="29" creationId="{592EB682-283B-8103-87E2-CBD7581BE853}"/>
+          </ac:spMkLst>
+        </pc:spChg>
+        <pc:spChg chg="add mod">
+          <ac:chgData name="Laboratories Aperture Science" userId="4ef7ff3058e5cb20" providerId="LiveId" clId="{75C87B12-65F8-4F4F-BEF0-CFEE6D12BA6B}" dt="2024-05-06T11:57:57.904" v="122" actId="1076"/>
+          <ac:spMkLst>
+            <pc:docMk/>
+            <pc:sldMk cId="2452836750" sldId="263"/>
+            <ac:spMk id="30" creationId="{9CA44906-3D9B-26B1-1814-A8E475876BF4}"/>
+          </ac:spMkLst>
+        </pc:spChg>
+        <pc:spChg chg="add mod">
+          <ac:chgData name="Laboratories Aperture Science" userId="4ef7ff3058e5cb20" providerId="LiveId" clId="{75C87B12-65F8-4F4F-BEF0-CFEE6D12BA6B}" dt="2024-05-06T11:58:02.068" v="124" actId="1076"/>
+          <ac:spMkLst>
+            <pc:docMk/>
+            <pc:sldMk cId="2452836750" sldId="263"/>
+            <ac:spMk id="31" creationId="{4B5D5876-0F2C-E716-0C6B-810269156088}"/>
+          </ac:spMkLst>
+        </pc:spChg>
+        <pc:spChg chg="add mod">
+          <ac:chgData name="Laboratories Aperture Science" userId="4ef7ff3058e5cb20" providerId="LiveId" clId="{75C87B12-65F8-4F4F-BEF0-CFEE6D12BA6B}" dt="2024-05-06T12:00:13.121" v="134" actId="1076"/>
+          <ac:spMkLst>
+            <pc:docMk/>
+            <pc:sldMk cId="2452836750" sldId="263"/>
+            <ac:spMk id="32" creationId="{07735725-4F05-56EA-FCA4-8A45B98267F1}"/>
+          </ac:spMkLst>
+        </pc:spChg>
+        <pc:spChg chg="add mod">
+          <ac:chgData name="Laboratories Aperture Science" userId="4ef7ff3058e5cb20" providerId="LiveId" clId="{75C87B12-65F8-4F4F-BEF0-CFEE6D12BA6B}" dt="2024-05-06T12:00:13.121" v="134" actId="1076"/>
+          <ac:spMkLst>
+            <pc:docMk/>
+            <pc:sldMk cId="2452836750" sldId="263"/>
+            <ac:spMk id="33" creationId="{C531316E-B464-B955-A7DE-4930BDEC6D82}"/>
+          </ac:spMkLst>
+        </pc:spChg>
+        <pc:spChg chg="add mod">
+          <ac:chgData name="Laboratories Aperture Science" userId="4ef7ff3058e5cb20" providerId="LiveId" clId="{75C87B12-65F8-4F4F-BEF0-CFEE6D12BA6B}" dt="2024-05-06T12:00:13.121" v="134" actId="1076"/>
+          <ac:spMkLst>
+            <pc:docMk/>
+            <pc:sldMk cId="2452836750" sldId="263"/>
+            <ac:spMk id="34" creationId="{3361996B-006C-B2C1-BD84-C15A15C84379}"/>
+          </ac:spMkLst>
+        </pc:spChg>
+        <pc:spChg chg="add mod">
+          <ac:chgData name="Laboratories Aperture Science" userId="4ef7ff3058e5cb20" providerId="LiveId" clId="{75C87B12-65F8-4F4F-BEF0-CFEE6D12BA6B}" dt="2024-05-06T12:01:24.744" v="145" actId="14100"/>
+          <ac:spMkLst>
+            <pc:docMk/>
+            <pc:sldMk cId="2452836750" sldId="263"/>
+            <ac:spMk id="39" creationId="{7C5B0618-3F43-E20D-81AD-936BF1567D2B}"/>
+          </ac:spMkLst>
+        </pc:spChg>
+        <pc:spChg chg="add mod">
+          <ac:chgData name="Laboratories Aperture Science" userId="4ef7ff3058e5cb20" providerId="LiveId" clId="{75C87B12-65F8-4F4F-BEF0-CFEE6D12BA6B}" dt="2024-05-06T12:01:28.769" v="147" actId="1076"/>
+          <ac:spMkLst>
+            <pc:docMk/>
+            <pc:sldMk cId="2452836750" sldId="263"/>
+            <ac:spMk id="40" creationId="{30491043-3E1F-7DD4-EE39-259F2BFB6E9B}"/>
+          </ac:spMkLst>
+        </pc:spChg>
+        <pc:spChg chg="add mod">
+          <ac:chgData name="Laboratories Aperture Science" userId="4ef7ff3058e5cb20" providerId="LiveId" clId="{75C87B12-65F8-4F4F-BEF0-CFEE6D12BA6B}" dt="2024-05-06T12:07:54.216" v="157" actId="1076"/>
+          <ac:spMkLst>
+            <pc:docMk/>
+            <pc:sldMk cId="2452836750" sldId="263"/>
+            <ac:spMk id="41" creationId="{8456F169-9179-0631-914A-2E7B2CD6D95B}"/>
+          </ac:spMkLst>
+        </pc:spChg>
+        <pc:spChg chg="add mod">
+          <ac:chgData name="Laboratories Aperture Science" userId="4ef7ff3058e5cb20" providerId="LiveId" clId="{75C87B12-65F8-4F4F-BEF0-CFEE6D12BA6B}" dt="2024-05-06T12:08:18.057" v="164" actId="1076"/>
+          <ac:spMkLst>
+            <pc:docMk/>
+            <pc:sldMk cId="2452836750" sldId="263"/>
+            <ac:spMk id="42" creationId="{1CA4C740-88F8-5911-5697-BB7524A08F6D}"/>
+          </ac:spMkLst>
+        </pc:spChg>
+        <pc:spChg chg="add mod">
+          <ac:chgData name="Laboratories Aperture Science" userId="4ef7ff3058e5cb20" providerId="LiveId" clId="{75C87B12-65F8-4F4F-BEF0-CFEE6D12BA6B}" dt="2024-05-06T12:08:14.517" v="163" actId="1076"/>
+          <ac:spMkLst>
+            <pc:docMk/>
+            <pc:sldMk cId="2452836750" sldId="263"/>
+            <ac:spMk id="43" creationId="{3D3EAFD8-469A-5EBC-6EE8-9BB5C31E18DF}"/>
+          </ac:spMkLst>
+        </pc:spChg>
+        <pc:spChg chg="add mod">
+          <ac:chgData name="Laboratories Aperture Science" userId="4ef7ff3058e5cb20" providerId="LiveId" clId="{75C87B12-65F8-4F4F-BEF0-CFEE6D12BA6B}" dt="2024-05-06T12:08:12.016" v="162" actId="1076"/>
+          <ac:spMkLst>
+            <pc:docMk/>
+            <pc:sldMk cId="2452836750" sldId="263"/>
+            <ac:spMk id="44" creationId="{BAE6B9D5-FF4C-8041-24CD-D234EFA8CC1B}"/>
+          </ac:spMkLst>
+        </pc:spChg>
+        <pc:spChg chg="add del mod">
+          <ac:chgData name="Laboratories Aperture Science" userId="4ef7ff3058e5cb20" providerId="LiveId" clId="{75C87B12-65F8-4F4F-BEF0-CFEE6D12BA6B}" dt="2024-05-06T12:08:25.551" v="167" actId="478"/>
+          <ac:spMkLst>
+            <pc:docMk/>
+            <pc:sldMk cId="2452836750" sldId="263"/>
+            <ac:spMk id="45" creationId="{B3900A35-13BE-D2AC-B7ED-87FF07F9E43B}"/>
+          </ac:spMkLst>
+        </pc:spChg>
+        <pc:grpChg chg="add mod">
+          <ac:chgData name="Laboratories Aperture Science" userId="4ef7ff3058e5cb20" providerId="LiveId" clId="{75C87B12-65F8-4F4F-BEF0-CFEE6D12BA6B}" dt="2024-05-06T12:01:13.041" v="142" actId="1076"/>
+          <ac:grpSpMkLst>
+            <pc:docMk/>
+            <pc:sldMk cId="2452836750" sldId="263"/>
+            <ac:grpSpMk id="35" creationId="{D41C7993-52AD-8F61-BFC6-A2F78CF8614E}"/>
+          </ac:grpSpMkLst>
+        </pc:grpChg>
+        <pc:grpChg chg="add">
+          <ac:chgData name="Laboratories Aperture Science" userId="4ef7ff3058e5cb20" providerId="LiveId" clId="{75C87B12-65F8-4F4F-BEF0-CFEE6D12BA6B}" dt="2024-05-06T12:00:29.343" v="137" actId="164"/>
+          <ac:grpSpMkLst>
+            <pc:docMk/>
+            <pc:sldMk cId="2452836750" sldId="263"/>
+            <ac:grpSpMk id="36" creationId="{83B7338A-8BE0-C726-14FD-0F8843ECF7ED}"/>
+          </ac:grpSpMkLst>
+        </pc:grpChg>
+        <pc:grpChg chg="add">
+          <ac:chgData name="Laboratories Aperture Science" userId="4ef7ff3058e5cb20" providerId="LiveId" clId="{75C87B12-65F8-4F4F-BEF0-CFEE6D12BA6B}" dt="2024-05-06T12:00:35.264" v="138" actId="164"/>
+          <ac:grpSpMkLst>
+            <pc:docMk/>
+            <pc:sldMk cId="2452836750" sldId="263"/>
+            <ac:grpSpMk id="37" creationId="{E985A205-7FDF-4886-124D-983015BB1F8F}"/>
+          </ac:grpSpMkLst>
+        </pc:grpChg>
+        <pc:grpChg chg="add">
+          <ac:chgData name="Laboratories Aperture Science" userId="4ef7ff3058e5cb20" providerId="LiveId" clId="{75C87B12-65F8-4F4F-BEF0-CFEE6D12BA6B}" dt="2024-05-06T12:00:39.625" v="139" actId="164"/>
+          <ac:grpSpMkLst>
+            <pc:docMk/>
+            <pc:sldMk cId="2452836750" sldId="263"/>
+            <ac:grpSpMk id="38" creationId="{18723478-03CB-6F91-1333-679F0EFEFBCC}"/>
+          </ac:grpSpMkLst>
+        </pc:grpChg>
+        <pc:cxnChg chg="add del mod">
+          <ac:chgData name="Laboratories Aperture Science" userId="4ef7ff3058e5cb20" providerId="LiveId" clId="{75C87B12-65F8-4F4F-BEF0-CFEE6D12BA6B}" dt="2024-05-06T11:52:31.359" v="78" actId="478"/>
+          <ac:cxnSpMkLst>
+            <pc:docMk/>
+            <pc:sldMk cId="2452836750" sldId="263"/>
+            <ac:cxnSpMk id="13" creationId="{B1D8DFED-6324-3D36-53C0-A741FF02275E}"/>
+          </ac:cxnSpMkLst>
+        </pc:cxnChg>
+        <pc:cxnChg chg="add del">
+          <ac:chgData name="Laboratories Aperture Science" userId="4ef7ff3058e5cb20" providerId="LiveId" clId="{75C87B12-65F8-4F4F-BEF0-CFEE6D12BA6B}" dt="2024-05-06T11:52:44.058" v="80" actId="478"/>
+          <ac:cxnSpMkLst>
+            <pc:docMk/>
+            <pc:sldMk cId="2452836750" sldId="263"/>
+            <ac:cxnSpMk id="16" creationId="{C40C23EA-77BD-8E63-B633-6306FCEBCB5A}"/>
+          </ac:cxnSpMkLst>
+        </pc:cxnChg>
+        <pc:cxnChg chg="add mod">
+          <ac:chgData name="Laboratories Aperture Science" userId="4ef7ff3058e5cb20" providerId="LiveId" clId="{75C87B12-65F8-4F4F-BEF0-CFEE6D12BA6B}" dt="2024-05-06T11:52:58.761" v="84" actId="14100"/>
+          <ac:cxnSpMkLst>
+            <pc:docMk/>
+            <pc:sldMk cId="2452836750" sldId="263"/>
+            <ac:cxnSpMk id="18" creationId="{E6F74789-B040-7CC3-9A75-50A1A16A14BF}"/>
+          </ac:cxnSpMkLst>
+        </pc:cxnChg>
+        <pc:cxnChg chg="add">
+          <ac:chgData name="Laboratories Aperture Science" userId="4ef7ff3058e5cb20" providerId="LiveId" clId="{75C87B12-65F8-4F4F-BEF0-CFEE6D12BA6B}" dt="2024-05-06T12:08:36.498" v="168" actId="11529"/>
+          <ac:cxnSpMkLst>
+            <pc:docMk/>
+            <pc:sldMk cId="2452836750" sldId="263"/>
+            <ac:cxnSpMk id="47" creationId="{821379E5-49EC-F088-2674-34952A9C768D}"/>
+          </ac:cxnSpMkLst>
+        </pc:cxnChg>
+      </pc:sldChg>
     </pc:docChg>
   </pc:docChgLst>
 </pc:chgInfo>
@@ -325,7 +645,7 @@
           <a:p>
             <a:fld id="{3DA55360-DDDC-4346-A6FA-426842ECECBE}" type="datetimeFigureOut">
               <a:rPr kumimoji="1" lang="zh-CN" altLang="en-US" smtClean="0"/>
-              <a:t>2024/4/15</a:t>
+              <a:t>2024/5/6</a:t>
             </a:fld>
             <a:endParaRPr kumimoji="1" lang="zh-CN" altLang="en-US"/>
           </a:p>
@@ -523,7 +843,7 @@
           <a:p>
             <a:fld id="{3DA55360-DDDC-4346-A6FA-426842ECECBE}" type="datetimeFigureOut">
               <a:rPr kumimoji="1" lang="zh-CN" altLang="en-US" smtClean="0"/>
-              <a:t>2024/4/15</a:t>
+              <a:t>2024/5/6</a:t>
             </a:fld>
             <a:endParaRPr kumimoji="1" lang="zh-CN" altLang="en-US"/>
           </a:p>
@@ -731,7 +1051,7 @@
           <a:p>
             <a:fld id="{3DA55360-DDDC-4346-A6FA-426842ECECBE}" type="datetimeFigureOut">
               <a:rPr kumimoji="1" lang="zh-CN" altLang="en-US" smtClean="0"/>
-              <a:t>2024/4/15</a:t>
+              <a:t>2024/5/6</a:t>
             </a:fld>
             <a:endParaRPr kumimoji="1" lang="zh-CN" altLang="en-US"/>
           </a:p>
@@ -929,7 +1249,7 @@
           <a:p>
             <a:fld id="{3DA55360-DDDC-4346-A6FA-426842ECECBE}" type="datetimeFigureOut">
               <a:rPr kumimoji="1" lang="zh-CN" altLang="en-US" smtClean="0"/>
-              <a:t>2024/4/15</a:t>
+              <a:t>2024/5/6</a:t>
             </a:fld>
             <a:endParaRPr kumimoji="1" lang="zh-CN" altLang="en-US"/>
           </a:p>
@@ -1204,7 +1524,7 @@
           <a:p>
             <a:fld id="{3DA55360-DDDC-4346-A6FA-426842ECECBE}" type="datetimeFigureOut">
               <a:rPr kumimoji="1" lang="zh-CN" altLang="en-US" smtClean="0"/>
-              <a:t>2024/4/15</a:t>
+              <a:t>2024/5/6</a:t>
             </a:fld>
             <a:endParaRPr kumimoji="1" lang="zh-CN" altLang="en-US"/>
           </a:p>
@@ -1469,7 +1789,7 @@
           <a:p>
             <a:fld id="{3DA55360-DDDC-4346-A6FA-426842ECECBE}" type="datetimeFigureOut">
               <a:rPr kumimoji="1" lang="zh-CN" altLang="en-US" smtClean="0"/>
-              <a:t>2024/4/15</a:t>
+              <a:t>2024/5/6</a:t>
             </a:fld>
             <a:endParaRPr kumimoji="1" lang="zh-CN" altLang="en-US"/>
           </a:p>
@@ -1881,7 +2201,7 @@
           <a:p>
             <a:fld id="{3DA55360-DDDC-4346-A6FA-426842ECECBE}" type="datetimeFigureOut">
               <a:rPr kumimoji="1" lang="zh-CN" altLang="en-US" smtClean="0"/>
-              <a:t>2024/4/15</a:t>
+              <a:t>2024/5/6</a:t>
             </a:fld>
             <a:endParaRPr kumimoji="1" lang="zh-CN" altLang="en-US"/>
           </a:p>
@@ -2022,7 +2342,7 @@
           <a:p>
             <a:fld id="{3DA55360-DDDC-4346-A6FA-426842ECECBE}" type="datetimeFigureOut">
               <a:rPr kumimoji="1" lang="zh-CN" altLang="en-US" smtClean="0"/>
-              <a:t>2024/4/15</a:t>
+              <a:t>2024/5/6</a:t>
             </a:fld>
             <a:endParaRPr kumimoji="1" lang="zh-CN" altLang="en-US"/>
           </a:p>
@@ -2135,7 +2455,7 @@
           <a:p>
             <a:fld id="{3DA55360-DDDC-4346-A6FA-426842ECECBE}" type="datetimeFigureOut">
               <a:rPr kumimoji="1" lang="zh-CN" altLang="en-US" smtClean="0"/>
-              <a:t>2024/4/15</a:t>
+              <a:t>2024/5/6</a:t>
             </a:fld>
             <a:endParaRPr kumimoji="1" lang="zh-CN" altLang="en-US"/>
           </a:p>
@@ -2446,7 +2766,7 @@
           <a:p>
             <a:fld id="{3DA55360-DDDC-4346-A6FA-426842ECECBE}" type="datetimeFigureOut">
               <a:rPr kumimoji="1" lang="zh-CN" altLang="en-US" smtClean="0"/>
-              <a:t>2024/4/15</a:t>
+              <a:t>2024/5/6</a:t>
             </a:fld>
             <a:endParaRPr kumimoji="1" lang="zh-CN" altLang="en-US"/>
           </a:p>
@@ -2734,7 +3054,7 @@
           <a:p>
             <a:fld id="{3DA55360-DDDC-4346-A6FA-426842ECECBE}" type="datetimeFigureOut">
               <a:rPr kumimoji="1" lang="zh-CN" altLang="en-US" smtClean="0"/>
-              <a:t>2024/4/15</a:t>
+              <a:t>2024/5/6</a:t>
             </a:fld>
             <a:endParaRPr kumimoji="1" lang="zh-CN" altLang="en-US"/>
           </a:p>
@@ -2975,7 +3295,7 @@
           <a:p>
             <a:fld id="{3DA55360-DDDC-4346-A6FA-426842ECECBE}" type="datetimeFigureOut">
               <a:rPr kumimoji="1" lang="zh-CN" altLang="en-US" smtClean="0"/>
-              <a:t>2024/4/15</a:t>
+              <a:t>2024/5/6</a:t>
             </a:fld>
             <a:endParaRPr kumimoji="1" lang="zh-CN" altLang="en-US"/>
           </a:p>
@@ -6645,6 +6965,1663 @@
 </p:sld>
 </file>
 
+<file path=ppt/slides/slide3.xml><?xml version="1.0" encoding="utf-8"?>
+<p:sld xmlns:a="http://schemas.openxmlformats.org/drawingml/2006/main" xmlns:r="http://schemas.openxmlformats.org/officeDocument/2006/relationships" xmlns:p="http://schemas.openxmlformats.org/presentationml/2006/main">
+  <p:cSld>
+    <p:spTree>
+      <p:nvGrpSpPr>
+        <p:cNvPr id="1" name=""/>
+        <p:cNvGrpSpPr/>
+        <p:nvPr/>
+      </p:nvGrpSpPr>
+      <p:grpSpPr>
+        <a:xfrm>
+          <a:off x="0" y="0"/>
+          <a:ext cx="0" cy="0"/>
+          <a:chOff x="0" y="0"/>
+          <a:chExt cx="0" cy="0"/>
+        </a:xfrm>
+      </p:grpSpPr>
+      <p:sp>
+        <p:nvSpPr>
+          <p:cNvPr id="2" name="圆角矩形 5">
+            <a:extLst>
+              <a:ext uri="{FF2B5EF4-FFF2-40B4-BE49-F238E27FC236}">
+                <a16:creationId xmlns:a16="http://schemas.microsoft.com/office/drawing/2014/main" id="{5C252725-6A29-BB2F-B72C-BB0C1A923CA7}"/>
+              </a:ext>
+            </a:extLst>
+          </p:cNvPr>
+          <p:cNvSpPr/>
+          <p:nvPr/>
+        </p:nvSpPr>
+        <p:spPr>
+          <a:xfrm>
+            <a:off x="246683" y="2177933"/>
+            <a:ext cx="722036" cy="458330"/>
+          </a:xfrm>
+          <a:prstGeom prst="roundRect">
+            <a:avLst/>
+          </a:prstGeom>
+          <a:solidFill>
+            <a:schemeClr val="accent1">
+              <a:lumMod val="50000"/>
+            </a:schemeClr>
+          </a:solidFill>
+        </p:spPr>
+        <p:style>
+          <a:lnRef idx="2">
+            <a:schemeClr val="accent5">
+              <a:shade val="15000"/>
+            </a:schemeClr>
+          </a:lnRef>
+          <a:fillRef idx="1">
+            <a:schemeClr val="accent5"/>
+          </a:fillRef>
+          <a:effectRef idx="0">
+            <a:schemeClr val="accent5"/>
+          </a:effectRef>
+          <a:fontRef idx="minor">
+            <a:schemeClr val="lt1"/>
+          </a:fontRef>
+        </p:style>
+        <p:txBody>
+          <a:bodyPr rtlCol="0" anchor="ctr"/>
+          <a:lstStyle/>
+          <a:p>
+            <a:pPr algn="ctr"/>
+            <a:r>
+              <a:rPr kumimoji="1" lang="en-US" altLang="zh-CN" sz="1100" dirty="0"/>
+              <a:t>PC</a:t>
+            </a:r>
+          </a:p>
+          <a:p>
+            <a:pPr algn="ctr"/>
+            <a:r>
+              <a:rPr kumimoji="1" lang="en-US" altLang="zh-CN" sz="1100" dirty="0"/>
+              <a:t>Register</a:t>
+            </a:r>
+            <a:endParaRPr kumimoji="1" lang="zh-CN" altLang="en-US" sz="1100" dirty="0"/>
+          </a:p>
+        </p:txBody>
+      </p:sp>
+      <p:sp>
+        <p:nvSpPr>
+          <p:cNvPr id="3" name="右箭头 25">
+            <a:extLst>
+              <a:ext uri="{FF2B5EF4-FFF2-40B4-BE49-F238E27FC236}">
+                <a16:creationId xmlns:a16="http://schemas.microsoft.com/office/drawing/2014/main" id="{E24AC7EF-02F7-9266-1F1D-786C7E8C9F97}"/>
+              </a:ext>
+            </a:extLst>
+          </p:cNvPr>
+          <p:cNvSpPr/>
+          <p:nvPr/>
+        </p:nvSpPr>
+        <p:spPr>
+          <a:xfrm>
+            <a:off x="1009462" y="2335196"/>
+            <a:ext cx="212558" cy="143801"/>
+          </a:xfrm>
+          <a:prstGeom prst="rightArrow">
+            <a:avLst/>
+          </a:prstGeom>
+          <a:solidFill>
+            <a:schemeClr val="accent1">
+              <a:lumMod val="75000"/>
+            </a:schemeClr>
+          </a:solidFill>
+        </p:spPr>
+        <p:style>
+          <a:lnRef idx="2">
+            <a:schemeClr val="accent1">
+              <a:shade val="15000"/>
+            </a:schemeClr>
+          </a:lnRef>
+          <a:fillRef idx="1">
+            <a:schemeClr val="accent1"/>
+          </a:fillRef>
+          <a:effectRef idx="0">
+            <a:schemeClr val="accent1"/>
+          </a:effectRef>
+          <a:fontRef idx="minor">
+            <a:schemeClr val="lt1"/>
+          </a:fontRef>
+        </p:style>
+        <p:txBody>
+          <a:bodyPr rtlCol="0" anchor="ctr"/>
+          <a:lstStyle/>
+          <a:p>
+            <a:pPr algn="ctr"/>
+            <a:endParaRPr kumimoji="1" lang="zh-CN" altLang="en-US" sz="1600"/>
+          </a:p>
+        </p:txBody>
+      </p:sp>
+      <p:sp>
+        <p:nvSpPr>
+          <p:cNvPr id="4" name="圆角矩形 6">
+            <a:extLst>
+              <a:ext uri="{FF2B5EF4-FFF2-40B4-BE49-F238E27FC236}">
+                <a16:creationId xmlns:a16="http://schemas.microsoft.com/office/drawing/2014/main" id="{6045BE78-AE73-93C4-FF21-0AAE14246AE1}"/>
+              </a:ext>
+            </a:extLst>
+          </p:cNvPr>
+          <p:cNvSpPr/>
+          <p:nvPr/>
+        </p:nvSpPr>
+        <p:spPr>
+          <a:xfrm>
+            <a:off x="1254820" y="2046141"/>
+            <a:ext cx="1028385" cy="721909"/>
+          </a:xfrm>
+          <a:prstGeom prst="roundRect">
+            <a:avLst/>
+          </a:prstGeom>
+        </p:spPr>
+        <p:style>
+          <a:lnRef idx="1">
+            <a:schemeClr val="accent4"/>
+          </a:lnRef>
+          <a:fillRef idx="2">
+            <a:schemeClr val="accent4"/>
+          </a:fillRef>
+          <a:effectRef idx="1">
+            <a:schemeClr val="accent4"/>
+          </a:effectRef>
+          <a:fontRef idx="minor">
+            <a:schemeClr val="dk1"/>
+          </a:fontRef>
+        </p:style>
+        <p:txBody>
+          <a:bodyPr rtlCol="0" anchor="ctr"/>
+          <a:lstStyle/>
+          <a:p>
+            <a:pPr algn="ctr"/>
+            <a:r>
+              <a:rPr kumimoji="1" lang="en-US" altLang="zh-CN" sz="1200" dirty="0"/>
+              <a:t>ROM</a:t>
+            </a:r>
+          </a:p>
+          <a:p>
+            <a:pPr algn="ctr"/>
+            <a:r>
+              <a:rPr kumimoji="1" lang="zh-CN" altLang="en-US" sz="1200" dirty="0"/>
+              <a:t>（存储指令）</a:t>
+            </a:r>
+          </a:p>
+        </p:txBody>
+      </p:sp>
+      <p:sp>
+        <p:nvSpPr>
+          <p:cNvPr id="5" name="圆角矩形 5">
+            <a:extLst>
+              <a:ext uri="{FF2B5EF4-FFF2-40B4-BE49-F238E27FC236}">
+                <a16:creationId xmlns:a16="http://schemas.microsoft.com/office/drawing/2014/main" id="{97B13F7F-5991-7BAE-885A-0CD5787A8F91}"/>
+              </a:ext>
+            </a:extLst>
+          </p:cNvPr>
+          <p:cNvSpPr/>
+          <p:nvPr/>
+        </p:nvSpPr>
+        <p:spPr>
+          <a:xfrm>
+            <a:off x="2602119" y="2177930"/>
+            <a:ext cx="722036" cy="458330"/>
+          </a:xfrm>
+          <a:prstGeom prst="roundRect">
+            <a:avLst/>
+          </a:prstGeom>
+          <a:solidFill>
+            <a:schemeClr val="accent1">
+              <a:lumMod val="50000"/>
+            </a:schemeClr>
+          </a:solidFill>
+        </p:spPr>
+        <p:style>
+          <a:lnRef idx="2">
+            <a:schemeClr val="accent5">
+              <a:shade val="15000"/>
+            </a:schemeClr>
+          </a:lnRef>
+          <a:fillRef idx="1">
+            <a:schemeClr val="accent5"/>
+          </a:fillRef>
+          <a:effectRef idx="0">
+            <a:schemeClr val="accent5"/>
+          </a:effectRef>
+          <a:fontRef idx="minor">
+            <a:schemeClr val="lt1"/>
+          </a:fontRef>
+        </p:style>
+        <p:txBody>
+          <a:bodyPr rtlCol="0" anchor="ctr"/>
+          <a:lstStyle/>
+          <a:p>
+            <a:pPr algn="ctr"/>
+            <a:r>
+              <a:rPr kumimoji="1" lang="zh-CN" altLang="en-US" sz="1100" dirty="0"/>
+              <a:t>译码器</a:t>
+            </a:r>
+          </a:p>
+        </p:txBody>
+      </p:sp>
+      <p:sp>
+        <p:nvSpPr>
+          <p:cNvPr id="6" name="右箭头 25">
+            <a:extLst>
+              <a:ext uri="{FF2B5EF4-FFF2-40B4-BE49-F238E27FC236}">
+                <a16:creationId xmlns:a16="http://schemas.microsoft.com/office/drawing/2014/main" id="{E048D397-6937-2DF2-F802-C7D376EA6D9B}"/>
+              </a:ext>
+            </a:extLst>
+          </p:cNvPr>
+          <p:cNvSpPr/>
+          <p:nvPr/>
+        </p:nvSpPr>
+        <p:spPr>
+          <a:xfrm>
+            <a:off x="2332635" y="2337022"/>
+            <a:ext cx="212558" cy="143801"/>
+          </a:xfrm>
+          <a:prstGeom prst="rightArrow">
+            <a:avLst/>
+          </a:prstGeom>
+          <a:solidFill>
+            <a:schemeClr val="accent1">
+              <a:lumMod val="75000"/>
+            </a:schemeClr>
+          </a:solidFill>
+        </p:spPr>
+        <p:style>
+          <a:lnRef idx="2">
+            <a:schemeClr val="accent1">
+              <a:shade val="15000"/>
+            </a:schemeClr>
+          </a:lnRef>
+          <a:fillRef idx="1">
+            <a:schemeClr val="accent1"/>
+          </a:fillRef>
+          <a:effectRef idx="0">
+            <a:schemeClr val="accent1"/>
+          </a:effectRef>
+          <a:fontRef idx="minor">
+            <a:schemeClr val="lt1"/>
+          </a:fontRef>
+        </p:style>
+        <p:txBody>
+          <a:bodyPr rtlCol="0" anchor="ctr"/>
+          <a:lstStyle/>
+          <a:p>
+            <a:pPr algn="ctr"/>
+            <a:endParaRPr kumimoji="1" lang="zh-CN" altLang="en-US" sz="1600"/>
+          </a:p>
+        </p:txBody>
+      </p:sp>
+      <p:sp>
+        <p:nvSpPr>
+          <p:cNvPr id="7" name="圆角矩形 8">
+            <a:extLst>
+              <a:ext uri="{FF2B5EF4-FFF2-40B4-BE49-F238E27FC236}">
+                <a16:creationId xmlns:a16="http://schemas.microsoft.com/office/drawing/2014/main" id="{3B261C0B-B8AD-A391-2946-96D5A505FFBA}"/>
+              </a:ext>
+            </a:extLst>
+          </p:cNvPr>
+          <p:cNvSpPr/>
+          <p:nvPr/>
+        </p:nvSpPr>
+        <p:spPr>
+          <a:xfrm>
+            <a:off x="3650565" y="1428294"/>
+            <a:ext cx="958749" cy="1957602"/>
+          </a:xfrm>
+          <a:prstGeom prst="roundRect">
+            <a:avLst/>
+          </a:prstGeom>
+        </p:spPr>
+        <p:style>
+          <a:lnRef idx="1">
+            <a:schemeClr val="accent4"/>
+          </a:lnRef>
+          <a:fillRef idx="2">
+            <a:schemeClr val="accent4"/>
+          </a:fillRef>
+          <a:effectRef idx="1">
+            <a:schemeClr val="accent4"/>
+          </a:effectRef>
+          <a:fontRef idx="minor">
+            <a:schemeClr val="dk1"/>
+          </a:fontRef>
+        </p:style>
+        <p:txBody>
+          <a:bodyPr rtlCol="0" anchor="ctr"/>
+          <a:lstStyle/>
+          <a:p>
+            <a:pPr algn="ctr"/>
+            <a:r>
+              <a:rPr kumimoji="1" lang="en-US" altLang="zh-CN" sz="1200" dirty="0"/>
+              <a:t>General</a:t>
+            </a:r>
+            <a:r>
+              <a:rPr kumimoji="1" lang="zh-CN" altLang="en-US" sz="1200" dirty="0"/>
+              <a:t> </a:t>
+            </a:r>
+            <a:r>
+              <a:rPr kumimoji="1" lang="en-US" altLang="zh-CN" sz="1200" dirty="0"/>
+              <a:t>Registers</a:t>
+            </a:r>
+            <a:endParaRPr kumimoji="1" lang="zh-CN" altLang="en-US" sz="1200" dirty="0"/>
+          </a:p>
+        </p:txBody>
+      </p:sp>
+      <p:sp>
+        <p:nvSpPr>
+          <p:cNvPr id="8" name="右箭头 25">
+            <a:extLst>
+              <a:ext uri="{FF2B5EF4-FFF2-40B4-BE49-F238E27FC236}">
+                <a16:creationId xmlns:a16="http://schemas.microsoft.com/office/drawing/2014/main" id="{E4E8CBAD-9FDD-7234-F666-F11804FC900F}"/>
+              </a:ext>
+            </a:extLst>
+          </p:cNvPr>
+          <p:cNvSpPr/>
+          <p:nvPr/>
+        </p:nvSpPr>
+        <p:spPr>
+          <a:xfrm>
+            <a:off x="3381081" y="2335196"/>
+            <a:ext cx="212558" cy="143801"/>
+          </a:xfrm>
+          <a:prstGeom prst="rightArrow">
+            <a:avLst/>
+          </a:prstGeom>
+          <a:solidFill>
+            <a:schemeClr val="accent1">
+              <a:lumMod val="75000"/>
+            </a:schemeClr>
+          </a:solidFill>
+        </p:spPr>
+        <p:style>
+          <a:lnRef idx="2">
+            <a:schemeClr val="accent1">
+              <a:shade val="15000"/>
+            </a:schemeClr>
+          </a:lnRef>
+          <a:fillRef idx="1">
+            <a:schemeClr val="accent1"/>
+          </a:fillRef>
+          <a:effectRef idx="0">
+            <a:schemeClr val="accent1"/>
+          </a:effectRef>
+          <a:fontRef idx="minor">
+            <a:schemeClr val="lt1"/>
+          </a:fontRef>
+        </p:style>
+        <p:txBody>
+          <a:bodyPr rtlCol="0" anchor="ctr"/>
+          <a:lstStyle/>
+          <a:p>
+            <a:pPr algn="ctr"/>
+            <a:endParaRPr kumimoji="1" lang="zh-CN" altLang="en-US" sz="1600"/>
+          </a:p>
+        </p:txBody>
+      </p:sp>
+      <p:sp>
+        <p:nvSpPr>
+          <p:cNvPr id="9" name="右箭头 25">
+            <a:extLst>
+              <a:ext uri="{FF2B5EF4-FFF2-40B4-BE49-F238E27FC236}">
+                <a16:creationId xmlns:a16="http://schemas.microsoft.com/office/drawing/2014/main" id="{03AAF6B6-59D7-7F43-4548-59BF65FCFD69}"/>
+              </a:ext>
+            </a:extLst>
+          </p:cNvPr>
+          <p:cNvSpPr/>
+          <p:nvPr/>
+        </p:nvSpPr>
+        <p:spPr>
+          <a:xfrm>
+            <a:off x="4660306" y="1614219"/>
+            <a:ext cx="212558" cy="143801"/>
+          </a:xfrm>
+          <a:prstGeom prst="rightArrow">
+            <a:avLst/>
+          </a:prstGeom>
+          <a:solidFill>
+            <a:schemeClr val="accent1">
+              <a:lumMod val="75000"/>
+            </a:schemeClr>
+          </a:solidFill>
+        </p:spPr>
+        <p:style>
+          <a:lnRef idx="2">
+            <a:schemeClr val="accent1">
+              <a:shade val="15000"/>
+            </a:schemeClr>
+          </a:lnRef>
+          <a:fillRef idx="1">
+            <a:schemeClr val="accent1"/>
+          </a:fillRef>
+          <a:effectRef idx="0">
+            <a:schemeClr val="accent1"/>
+          </a:effectRef>
+          <a:fontRef idx="minor">
+            <a:schemeClr val="lt1"/>
+          </a:fontRef>
+        </p:style>
+        <p:txBody>
+          <a:bodyPr rtlCol="0" anchor="ctr"/>
+          <a:lstStyle/>
+          <a:p>
+            <a:pPr algn="ctr"/>
+            <a:endParaRPr kumimoji="1" lang="zh-CN" altLang="en-US" sz="1600"/>
+          </a:p>
+        </p:txBody>
+      </p:sp>
+      <p:sp>
+        <p:nvSpPr>
+          <p:cNvPr id="10" name="右箭头 25">
+            <a:extLst>
+              <a:ext uri="{FF2B5EF4-FFF2-40B4-BE49-F238E27FC236}">
+                <a16:creationId xmlns:a16="http://schemas.microsoft.com/office/drawing/2014/main" id="{B7C9BB1E-2A2B-C4B1-4BB7-508FE73AEFC0}"/>
+              </a:ext>
+            </a:extLst>
+          </p:cNvPr>
+          <p:cNvSpPr/>
+          <p:nvPr/>
+        </p:nvSpPr>
+        <p:spPr>
+          <a:xfrm>
+            <a:off x="4640320" y="2892617"/>
+            <a:ext cx="608761" cy="143801"/>
+          </a:xfrm>
+          <a:prstGeom prst="rightArrow">
+            <a:avLst/>
+          </a:prstGeom>
+          <a:solidFill>
+            <a:schemeClr val="accent1">
+              <a:lumMod val="75000"/>
+            </a:schemeClr>
+          </a:solidFill>
+        </p:spPr>
+        <p:style>
+          <a:lnRef idx="2">
+            <a:schemeClr val="accent1">
+              <a:shade val="15000"/>
+            </a:schemeClr>
+          </a:lnRef>
+          <a:fillRef idx="1">
+            <a:schemeClr val="accent1"/>
+          </a:fillRef>
+          <a:effectRef idx="0">
+            <a:schemeClr val="accent1"/>
+          </a:effectRef>
+          <a:fontRef idx="minor">
+            <a:schemeClr val="lt1"/>
+          </a:fontRef>
+        </p:style>
+        <p:txBody>
+          <a:bodyPr rtlCol="0" anchor="ctr"/>
+          <a:lstStyle/>
+          <a:p>
+            <a:pPr algn="ctr"/>
+            <a:endParaRPr kumimoji="1" lang="zh-CN" altLang="en-US" sz="1600"/>
+          </a:p>
+        </p:txBody>
+      </p:sp>
+      <p:cxnSp>
+        <p:nvCxnSpPr>
+          <p:cNvPr id="18" name="Elbow Connector 17">
+            <a:extLst>
+              <a:ext uri="{FF2B5EF4-FFF2-40B4-BE49-F238E27FC236}">
+                <a16:creationId xmlns:a16="http://schemas.microsoft.com/office/drawing/2014/main" id="{E6F74789-B040-7CC3-9A75-50A1A16A14BF}"/>
+              </a:ext>
+            </a:extLst>
+          </p:cNvPr>
+          <p:cNvCxnSpPr>
+            <a:cxnSpLocks/>
+            <a:stCxn id="2" idx="0"/>
+          </p:cNvCxnSpPr>
+          <p:nvPr/>
+        </p:nvCxnSpPr>
+        <p:spPr>
+          <a:xfrm rot="5400000" flipH="1" flipV="1">
+            <a:off x="2311716" y="-383214"/>
+            <a:ext cx="857133" cy="4265163"/>
+          </a:xfrm>
+          <a:prstGeom prst="bentConnector2">
+            <a:avLst/>
+          </a:prstGeom>
+          <a:ln>
+            <a:tailEnd type="triangle"/>
+          </a:ln>
+        </p:spPr>
+        <p:style>
+          <a:lnRef idx="1">
+            <a:schemeClr val="accent1"/>
+          </a:lnRef>
+          <a:fillRef idx="0">
+            <a:schemeClr val="accent1"/>
+          </a:fillRef>
+          <a:effectRef idx="0">
+            <a:schemeClr val="accent1"/>
+          </a:effectRef>
+          <a:fontRef idx="minor">
+            <a:schemeClr val="tx1"/>
+          </a:fontRef>
+        </p:style>
+      </p:cxnSp>
+      <p:grpSp>
+        <p:nvGrpSpPr>
+          <p:cNvPr id="36" name="Group 35">
+            <a:extLst>
+              <a:ext uri="{FF2B5EF4-FFF2-40B4-BE49-F238E27FC236}">
+                <a16:creationId xmlns:a16="http://schemas.microsoft.com/office/drawing/2014/main" id="{83B7338A-8BE0-C726-14FD-0F8843ECF7ED}"/>
+              </a:ext>
+            </a:extLst>
+          </p:cNvPr>
+          <p:cNvGrpSpPr/>
+          <p:nvPr/>
+        </p:nvGrpSpPr>
+        <p:grpSpPr>
+          <a:xfrm>
+            <a:off x="4756419" y="1296144"/>
+            <a:ext cx="453915" cy="459930"/>
+            <a:chOff x="4756419" y="1296144"/>
+            <a:chExt cx="453915" cy="459930"/>
+          </a:xfrm>
+        </p:grpSpPr>
+        <p:sp>
+          <p:nvSpPr>
+            <p:cNvPr id="12" name="斜纹 15">
+              <a:extLst>
+                <a:ext uri="{FF2B5EF4-FFF2-40B4-BE49-F238E27FC236}">
+                  <a16:creationId xmlns:a16="http://schemas.microsoft.com/office/drawing/2014/main" id="{C2DEC991-CA6F-0ECB-E9F2-D24C43B5707A}"/>
+                </a:ext>
+              </a:extLst>
+            </p:cNvPr>
+            <p:cNvSpPr/>
+            <p:nvPr/>
+          </p:nvSpPr>
+          <p:spPr>
+            <a:xfrm rot="18877310" flipH="1" flipV="1">
+              <a:off x="4753412" y="1299151"/>
+              <a:ext cx="459930" cy="453915"/>
+            </a:xfrm>
+            <a:prstGeom prst="diagStripe">
+              <a:avLst/>
+            </a:prstGeom>
+            <a:solidFill>
+              <a:schemeClr val="accent1">
+                <a:lumMod val="50000"/>
+              </a:schemeClr>
+            </a:solidFill>
+            <a:ln>
+              <a:solidFill>
+                <a:schemeClr val="accent1">
+                  <a:lumMod val="50000"/>
+                </a:schemeClr>
+              </a:solidFill>
+            </a:ln>
+          </p:spPr>
+          <p:style>
+            <a:lnRef idx="2">
+              <a:schemeClr val="accent1">
+                <a:shade val="15000"/>
+              </a:schemeClr>
+            </a:lnRef>
+            <a:fillRef idx="1">
+              <a:schemeClr val="accent1"/>
+            </a:fillRef>
+            <a:effectRef idx="0">
+              <a:schemeClr val="accent1"/>
+            </a:effectRef>
+            <a:fontRef idx="minor">
+              <a:schemeClr val="lt1"/>
+            </a:fontRef>
+          </p:style>
+          <p:txBody>
+            <a:bodyPr rtlCol="0" anchor="ctr"/>
+            <a:lstStyle/>
+            <a:p>
+              <a:pPr algn="ctr"/>
+              <a:endParaRPr kumimoji="1" lang="zh-CN" altLang="en-US" sz="1600" dirty="0">
+                <a:solidFill>
+                  <a:schemeClr val="tx1"/>
+                </a:solidFill>
+              </a:endParaRPr>
+            </a:p>
+          </p:txBody>
+        </p:sp>
+        <p:sp>
+          <p:nvSpPr>
+            <p:cNvPr id="22" name="TextBox 21">
+              <a:extLst>
+                <a:ext uri="{FF2B5EF4-FFF2-40B4-BE49-F238E27FC236}">
+                  <a16:creationId xmlns:a16="http://schemas.microsoft.com/office/drawing/2014/main" id="{79560375-6E4B-C687-B622-7EA19ECCA612}"/>
+                </a:ext>
+              </a:extLst>
+            </p:cNvPr>
+            <p:cNvSpPr txBox="1"/>
+            <p:nvPr/>
+          </p:nvSpPr>
+          <p:spPr>
+            <a:xfrm rot="5400000">
+              <a:off x="4874252" y="1405844"/>
+              <a:ext cx="401072" cy="215444"/>
+            </a:xfrm>
+            <a:prstGeom prst="rect">
+              <a:avLst/>
+            </a:prstGeom>
+            <a:noFill/>
+          </p:spPr>
+          <p:txBody>
+            <a:bodyPr wrap="none" rtlCol="0">
+              <a:spAutoFit/>
+            </a:bodyPr>
+            <a:lstStyle/>
+            <a:p>
+              <a:r>
+                <a:rPr lang="en-CN" sz="800" dirty="0">
+                  <a:solidFill>
+                    <a:schemeClr val="bg1"/>
+                  </a:solidFill>
+                </a:rPr>
+                <a:t>MUX</a:t>
+              </a:r>
+            </a:p>
+          </p:txBody>
+        </p:sp>
+      </p:grpSp>
+      <p:grpSp>
+        <p:nvGrpSpPr>
+          <p:cNvPr id="37" name="Group 36">
+            <a:extLst>
+              <a:ext uri="{FF2B5EF4-FFF2-40B4-BE49-F238E27FC236}">
+                <a16:creationId xmlns:a16="http://schemas.microsoft.com/office/drawing/2014/main" id="{E985A205-7FDF-4886-124D-983015BB1F8F}"/>
+              </a:ext>
+            </a:extLst>
+          </p:cNvPr>
+          <p:cNvGrpSpPr/>
+          <p:nvPr/>
+        </p:nvGrpSpPr>
+        <p:grpSpPr>
+          <a:xfrm>
+            <a:off x="5488071" y="2156162"/>
+            <a:ext cx="553398" cy="584141"/>
+            <a:chOff x="5488071" y="2156162"/>
+            <a:chExt cx="553398" cy="584141"/>
+          </a:xfrm>
+        </p:grpSpPr>
+        <p:sp>
+          <p:nvSpPr>
+            <p:cNvPr id="23" name="斜纹 15">
+              <a:extLst>
+                <a:ext uri="{FF2B5EF4-FFF2-40B4-BE49-F238E27FC236}">
+                  <a16:creationId xmlns:a16="http://schemas.microsoft.com/office/drawing/2014/main" id="{B01BC00B-5339-22C4-CC22-898D424936D1}"/>
+                </a:ext>
+              </a:extLst>
+            </p:cNvPr>
+            <p:cNvSpPr/>
+            <p:nvPr/>
+          </p:nvSpPr>
+          <p:spPr>
+            <a:xfrm rot="18791049" flipH="1" flipV="1">
+              <a:off x="5472788" y="2171622"/>
+              <a:ext cx="583964" cy="553398"/>
+            </a:xfrm>
+            <a:prstGeom prst="diagStripe">
+              <a:avLst/>
+            </a:prstGeom>
+            <a:solidFill>
+              <a:schemeClr val="accent1">
+                <a:lumMod val="50000"/>
+              </a:schemeClr>
+            </a:solidFill>
+            <a:ln>
+              <a:solidFill>
+                <a:schemeClr val="accent1">
+                  <a:lumMod val="50000"/>
+                </a:schemeClr>
+              </a:solidFill>
+            </a:ln>
+          </p:spPr>
+          <p:style>
+            <a:lnRef idx="2">
+              <a:schemeClr val="accent1">
+                <a:shade val="15000"/>
+              </a:schemeClr>
+            </a:lnRef>
+            <a:fillRef idx="1">
+              <a:schemeClr val="accent1"/>
+            </a:fillRef>
+            <a:effectRef idx="0">
+              <a:schemeClr val="accent1"/>
+            </a:effectRef>
+            <a:fontRef idx="minor">
+              <a:schemeClr val="lt1"/>
+            </a:fontRef>
+          </p:style>
+          <p:txBody>
+            <a:bodyPr rtlCol="0" anchor="ctr"/>
+            <a:lstStyle/>
+            <a:p>
+              <a:pPr algn="ctr"/>
+              <a:endParaRPr kumimoji="1" lang="zh-CN" altLang="en-US" sz="1600" dirty="0">
+                <a:solidFill>
+                  <a:schemeClr val="tx1"/>
+                </a:solidFill>
+              </a:endParaRPr>
+            </a:p>
+          </p:txBody>
+        </p:sp>
+        <p:sp>
+          <p:nvSpPr>
+            <p:cNvPr id="24" name="TextBox 23">
+              <a:extLst>
+                <a:ext uri="{FF2B5EF4-FFF2-40B4-BE49-F238E27FC236}">
+                  <a16:creationId xmlns:a16="http://schemas.microsoft.com/office/drawing/2014/main" id="{4EFC7B20-D2E6-2470-BF36-597ACCE861F1}"/>
+                </a:ext>
+              </a:extLst>
+            </p:cNvPr>
+            <p:cNvSpPr txBox="1"/>
+            <p:nvPr/>
+          </p:nvSpPr>
+          <p:spPr>
+            <a:xfrm rot="5400000">
+              <a:off x="5663803" y="2248976"/>
+              <a:ext cx="401072" cy="215444"/>
+            </a:xfrm>
+            <a:prstGeom prst="rect">
+              <a:avLst/>
+            </a:prstGeom>
+            <a:noFill/>
+          </p:spPr>
+          <p:txBody>
+            <a:bodyPr wrap="none" rtlCol="0">
+              <a:spAutoFit/>
+            </a:bodyPr>
+            <a:lstStyle/>
+            <a:p>
+              <a:r>
+                <a:rPr lang="en-CN" sz="800" dirty="0">
+                  <a:solidFill>
+                    <a:schemeClr val="bg1"/>
+                  </a:solidFill>
+                </a:rPr>
+                <a:t>MUX</a:t>
+              </a:r>
+            </a:p>
+          </p:txBody>
+        </p:sp>
+      </p:grpSp>
+      <p:sp>
+        <p:nvSpPr>
+          <p:cNvPr id="25" name="TextBox 24">
+            <a:extLst>
+              <a:ext uri="{FF2B5EF4-FFF2-40B4-BE49-F238E27FC236}">
+                <a16:creationId xmlns:a16="http://schemas.microsoft.com/office/drawing/2014/main" id="{6BB7B779-4487-CE26-1C67-1729F239376B}"/>
+              </a:ext>
+            </a:extLst>
+          </p:cNvPr>
+          <p:cNvSpPr txBox="1"/>
+          <p:nvPr/>
+        </p:nvSpPr>
+        <p:spPr>
+          <a:xfrm>
+            <a:off x="4640320" y="1954954"/>
+            <a:ext cx="306494" cy="369332"/>
+          </a:xfrm>
+          <a:prstGeom prst="rect">
+            <a:avLst/>
+          </a:prstGeom>
+          <a:noFill/>
+        </p:spPr>
+        <p:txBody>
+          <a:bodyPr wrap="none" rtlCol="0">
+            <a:spAutoFit/>
+          </a:bodyPr>
+          <a:lstStyle/>
+          <a:p>
+            <a:r>
+              <a:rPr lang="en-CN" dirty="0"/>
+              <a:t>4</a:t>
+            </a:r>
+          </a:p>
+        </p:txBody>
+      </p:sp>
+      <p:sp>
+        <p:nvSpPr>
+          <p:cNvPr id="26" name="右箭头 25">
+            <a:extLst>
+              <a:ext uri="{FF2B5EF4-FFF2-40B4-BE49-F238E27FC236}">
+                <a16:creationId xmlns:a16="http://schemas.microsoft.com/office/drawing/2014/main" id="{96B89678-1657-8836-C667-C3058245A1DC}"/>
+              </a:ext>
+            </a:extLst>
+          </p:cNvPr>
+          <p:cNvSpPr/>
+          <p:nvPr/>
+        </p:nvSpPr>
+        <p:spPr>
+          <a:xfrm>
+            <a:off x="4903870" y="2078629"/>
+            <a:ext cx="796826" cy="143801"/>
+          </a:xfrm>
+          <a:prstGeom prst="rightArrow">
+            <a:avLst/>
+          </a:prstGeom>
+          <a:solidFill>
+            <a:schemeClr val="accent1">
+              <a:lumMod val="75000"/>
+            </a:schemeClr>
+          </a:solidFill>
+        </p:spPr>
+        <p:style>
+          <a:lnRef idx="2">
+            <a:schemeClr val="accent1">
+              <a:shade val="15000"/>
+            </a:schemeClr>
+          </a:lnRef>
+          <a:fillRef idx="1">
+            <a:schemeClr val="accent1"/>
+          </a:fillRef>
+          <a:effectRef idx="0">
+            <a:schemeClr val="accent1"/>
+          </a:effectRef>
+          <a:fontRef idx="minor">
+            <a:schemeClr val="lt1"/>
+          </a:fontRef>
+        </p:style>
+        <p:txBody>
+          <a:bodyPr rtlCol="0" anchor="ctr"/>
+          <a:lstStyle/>
+          <a:p>
+            <a:pPr algn="ctr"/>
+            <a:endParaRPr kumimoji="1" lang="zh-CN" altLang="en-US" sz="1600"/>
+          </a:p>
+        </p:txBody>
+      </p:sp>
+      <p:sp>
+        <p:nvSpPr>
+          <p:cNvPr id="27" name="TextBox 26">
+            <a:extLst>
+              <a:ext uri="{FF2B5EF4-FFF2-40B4-BE49-F238E27FC236}">
+                <a16:creationId xmlns:a16="http://schemas.microsoft.com/office/drawing/2014/main" id="{5751D18E-85D4-18AD-546C-F08310B50DCC}"/>
+              </a:ext>
+            </a:extLst>
+          </p:cNvPr>
+          <p:cNvSpPr txBox="1"/>
+          <p:nvPr/>
+        </p:nvSpPr>
+        <p:spPr>
+          <a:xfrm>
+            <a:off x="4615521" y="2481470"/>
+            <a:ext cx="453970" cy="261610"/>
+          </a:xfrm>
+          <a:prstGeom prst="rect">
+            <a:avLst/>
+          </a:prstGeom>
+          <a:noFill/>
+        </p:spPr>
+        <p:txBody>
+          <a:bodyPr wrap="none" rtlCol="0">
+            <a:spAutoFit/>
+          </a:bodyPr>
+          <a:lstStyle/>
+          <a:p>
+            <a:r>
+              <a:rPr lang="en-CN" sz="1050" dirty="0"/>
+              <a:t>imm</a:t>
+            </a:r>
+          </a:p>
+        </p:txBody>
+      </p:sp>
+      <p:sp>
+        <p:nvSpPr>
+          <p:cNvPr id="28" name="右箭头 25">
+            <a:extLst>
+              <a:ext uri="{FF2B5EF4-FFF2-40B4-BE49-F238E27FC236}">
+                <a16:creationId xmlns:a16="http://schemas.microsoft.com/office/drawing/2014/main" id="{0DA74857-05D3-CCAB-6877-D1A3303D5FE2}"/>
+              </a:ext>
+            </a:extLst>
+          </p:cNvPr>
+          <p:cNvSpPr/>
+          <p:nvPr/>
+        </p:nvSpPr>
+        <p:spPr>
+          <a:xfrm>
+            <a:off x="5036524" y="2548540"/>
+            <a:ext cx="212558" cy="143801"/>
+          </a:xfrm>
+          <a:prstGeom prst="rightArrow">
+            <a:avLst/>
+          </a:prstGeom>
+          <a:solidFill>
+            <a:schemeClr val="accent1">
+              <a:lumMod val="75000"/>
+            </a:schemeClr>
+          </a:solidFill>
+        </p:spPr>
+        <p:style>
+          <a:lnRef idx="2">
+            <a:schemeClr val="accent1">
+              <a:shade val="15000"/>
+            </a:schemeClr>
+          </a:lnRef>
+          <a:fillRef idx="1">
+            <a:schemeClr val="accent1"/>
+          </a:fillRef>
+          <a:effectRef idx="0">
+            <a:schemeClr val="accent1"/>
+          </a:effectRef>
+          <a:fontRef idx="minor">
+            <a:schemeClr val="lt1"/>
+          </a:fontRef>
+        </p:style>
+        <p:txBody>
+          <a:bodyPr rtlCol="0" anchor="ctr"/>
+          <a:lstStyle/>
+          <a:p>
+            <a:pPr algn="ctr"/>
+            <a:endParaRPr kumimoji="1" lang="zh-CN" altLang="en-US" sz="1600"/>
+          </a:p>
+        </p:txBody>
+      </p:sp>
+      <p:grpSp>
+        <p:nvGrpSpPr>
+          <p:cNvPr id="38" name="Group 37">
+            <a:extLst>
+              <a:ext uri="{FF2B5EF4-FFF2-40B4-BE49-F238E27FC236}">
+                <a16:creationId xmlns:a16="http://schemas.microsoft.com/office/drawing/2014/main" id="{18723478-03CB-6F91-1333-679F0EFEFBCC}"/>
+              </a:ext>
+            </a:extLst>
+          </p:cNvPr>
+          <p:cNvGrpSpPr/>
+          <p:nvPr/>
+        </p:nvGrpSpPr>
+        <p:grpSpPr>
+          <a:xfrm>
+            <a:off x="5053207" y="2587885"/>
+            <a:ext cx="453915" cy="459930"/>
+            <a:chOff x="5053207" y="2587885"/>
+            <a:chExt cx="453915" cy="459930"/>
+          </a:xfrm>
+        </p:grpSpPr>
+        <p:sp>
+          <p:nvSpPr>
+            <p:cNvPr id="29" name="斜纹 15">
+              <a:extLst>
+                <a:ext uri="{FF2B5EF4-FFF2-40B4-BE49-F238E27FC236}">
+                  <a16:creationId xmlns:a16="http://schemas.microsoft.com/office/drawing/2014/main" id="{592EB682-283B-8103-87E2-CBD7581BE853}"/>
+                </a:ext>
+              </a:extLst>
+            </p:cNvPr>
+            <p:cNvSpPr/>
+            <p:nvPr/>
+          </p:nvSpPr>
+          <p:spPr>
+            <a:xfrm rot="18875902" flipH="1" flipV="1">
+              <a:off x="5050200" y="2590892"/>
+              <a:ext cx="459930" cy="453915"/>
+            </a:xfrm>
+            <a:prstGeom prst="diagStripe">
+              <a:avLst/>
+            </a:prstGeom>
+            <a:solidFill>
+              <a:schemeClr val="accent1">
+                <a:lumMod val="50000"/>
+              </a:schemeClr>
+            </a:solidFill>
+            <a:ln>
+              <a:solidFill>
+                <a:schemeClr val="accent1">
+                  <a:lumMod val="50000"/>
+                </a:schemeClr>
+              </a:solidFill>
+            </a:ln>
+          </p:spPr>
+          <p:style>
+            <a:lnRef idx="2">
+              <a:schemeClr val="accent1">
+                <a:shade val="15000"/>
+              </a:schemeClr>
+            </a:lnRef>
+            <a:fillRef idx="1">
+              <a:schemeClr val="accent1"/>
+            </a:fillRef>
+            <a:effectRef idx="0">
+              <a:schemeClr val="accent1"/>
+            </a:effectRef>
+            <a:fontRef idx="minor">
+              <a:schemeClr val="lt1"/>
+            </a:fontRef>
+          </p:style>
+          <p:txBody>
+            <a:bodyPr rtlCol="0" anchor="ctr"/>
+            <a:lstStyle/>
+            <a:p>
+              <a:pPr algn="ctr"/>
+              <a:endParaRPr kumimoji="1" lang="zh-CN" altLang="en-US" sz="1600" dirty="0">
+                <a:solidFill>
+                  <a:schemeClr val="tx1"/>
+                </a:solidFill>
+              </a:endParaRPr>
+            </a:p>
+          </p:txBody>
+        </p:sp>
+        <p:sp>
+          <p:nvSpPr>
+            <p:cNvPr id="30" name="TextBox 29">
+              <a:extLst>
+                <a:ext uri="{FF2B5EF4-FFF2-40B4-BE49-F238E27FC236}">
+                  <a16:creationId xmlns:a16="http://schemas.microsoft.com/office/drawing/2014/main" id="{9CA44906-3D9B-26B1-1814-A8E475876BF4}"/>
+                </a:ext>
+              </a:extLst>
+            </p:cNvPr>
+            <p:cNvSpPr txBox="1"/>
+            <p:nvPr/>
+          </p:nvSpPr>
+          <p:spPr>
+            <a:xfrm rot="5400000">
+              <a:off x="5157616" y="2700139"/>
+              <a:ext cx="401072" cy="215444"/>
+            </a:xfrm>
+            <a:prstGeom prst="rect">
+              <a:avLst/>
+            </a:prstGeom>
+            <a:noFill/>
+          </p:spPr>
+          <p:txBody>
+            <a:bodyPr wrap="none" rtlCol="0">
+              <a:spAutoFit/>
+            </a:bodyPr>
+            <a:lstStyle/>
+            <a:p>
+              <a:r>
+                <a:rPr lang="en-CN" sz="800" dirty="0">
+                  <a:solidFill>
+                    <a:schemeClr val="bg1"/>
+                  </a:solidFill>
+                </a:rPr>
+                <a:t>MUX</a:t>
+              </a:r>
+            </a:p>
+          </p:txBody>
+        </p:sp>
+      </p:grpSp>
+      <p:sp>
+        <p:nvSpPr>
+          <p:cNvPr id="31" name="右箭头 25">
+            <a:extLst>
+              <a:ext uri="{FF2B5EF4-FFF2-40B4-BE49-F238E27FC236}">
+                <a16:creationId xmlns:a16="http://schemas.microsoft.com/office/drawing/2014/main" id="{4B5D5876-0F2C-E716-0C6B-810269156088}"/>
+              </a:ext>
+            </a:extLst>
+          </p:cNvPr>
+          <p:cNvSpPr/>
+          <p:nvPr/>
+        </p:nvSpPr>
+        <p:spPr>
+          <a:xfrm>
+            <a:off x="5470110" y="2634667"/>
+            <a:ext cx="212558" cy="143801"/>
+          </a:xfrm>
+          <a:prstGeom prst="rightArrow">
+            <a:avLst/>
+          </a:prstGeom>
+          <a:solidFill>
+            <a:schemeClr val="accent1">
+              <a:lumMod val="75000"/>
+            </a:schemeClr>
+          </a:solidFill>
+        </p:spPr>
+        <p:style>
+          <a:lnRef idx="2">
+            <a:schemeClr val="accent1">
+              <a:shade val="15000"/>
+            </a:schemeClr>
+          </a:lnRef>
+          <a:fillRef idx="1">
+            <a:schemeClr val="accent1"/>
+          </a:fillRef>
+          <a:effectRef idx="0">
+            <a:schemeClr val="accent1"/>
+          </a:effectRef>
+          <a:fontRef idx="minor">
+            <a:schemeClr val="lt1"/>
+          </a:fontRef>
+        </p:style>
+        <p:txBody>
+          <a:bodyPr rtlCol="0" anchor="ctr"/>
+          <a:lstStyle/>
+          <a:p>
+            <a:pPr algn="ctr"/>
+            <a:endParaRPr kumimoji="1" lang="zh-CN" altLang="en-US" sz="1600"/>
+          </a:p>
+        </p:txBody>
+      </p:sp>
+      <p:grpSp>
+        <p:nvGrpSpPr>
+          <p:cNvPr id="35" name="Group 34">
+            <a:extLst>
+              <a:ext uri="{FF2B5EF4-FFF2-40B4-BE49-F238E27FC236}">
+                <a16:creationId xmlns:a16="http://schemas.microsoft.com/office/drawing/2014/main" id="{D41C7993-52AD-8F61-BFC6-A2F78CF8614E}"/>
+              </a:ext>
+            </a:extLst>
+          </p:cNvPr>
+          <p:cNvGrpSpPr/>
+          <p:nvPr/>
+        </p:nvGrpSpPr>
+        <p:grpSpPr>
+          <a:xfrm>
+            <a:off x="6044363" y="1579947"/>
+            <a:ext cx="893885" cy="755249"/>
+            <a:chOff x="6341736" y="2151823"/>
+            <a:chExt cx="893885" cy="755249"/>
+          </a:xfrm>
+        </p:grpSpPr>
+        <p:sp>
+          <p:nvSpPr>
+            <p:cNvPr id="32" name="半闭框 3">
+              <a:extLst>
+                <a:ext uri="{FF2B5EF4-FFF2-40B4-BE49-F238E27FC236}">
+                  <a16:creationId xmlns:a16="http://schemas.microsoft.com/office/drawing/2014/main" id="{07735725-4F05-56EA-FCA4-8A45B98267F1}"/>
+                </a:ext>
+              </a:extLst>
+            </p:cNvPr>
+            <p:cNvSpPr/>
+            <p:nvPr/>
+          </p:nvSpPr>
+          <p:spPr>
+            <a:xfrm rot="8100000">
+              <a:off x="6341736" y="2151823"/>
+              <a:ext cx="588974" cy="588974"/>
+            </a:xfrm>
+            <a:prstGeom prst="halfFrame">
+              <a:avLst>
+                <a:gd name="adj1" fmla="val 36223"/>
+                <a:gd name="adj2" fmla="val 35637"/>
+              </a:avLst>
+            </a:prstGeom>
+          </p:spPr>
+          <p:style>
+            <a:lnRef idx="2">
+              <a:schemeClr val="accent3">
+                <a:shade val="15000"/>
+              </a:schemeClr>
+            </a:lnRef>
+            <a:fillRef idx="1">
+              <a:schemeClr val="accent3"/>
+            </a:fillRef>
+            <a:effectRef idx="0">
+              <a:schemeClr val="accent3"/>
+            </a:effectRef>
+            <a:fontRef idx="minor">
+              <a:schemeClr val="lt1"/>
+            </a:fontRef>
+          </p:style>
+          <p:txBody>
+            <a:bodyPr rtlCol="0" anchor="ctr"/>
+            <a:lstStyle/>
+            <a:p>
+              <a:pPr algn="ctr"/>
+              <a:endParaRPr kumimoji="1" lang="zh-CN" altLang="en-US" sz="1600" dirty="0">
+                <a:solidFill>
+                  <a:schemeClr val="tx1"/>
+                </a:solidFill>
+              </a:endParaRPr>
+            </a:p>
+          </p:txBody>
+        </p:sp>
+        <p:sp>
+          <p:nvSpPr>
+            <p:cNvPr id="33" name="矩形 60">
+              <a:extLst>
+                <a:ext uri="{FF2B5EF4-FFF2-40B4-BE49-F238E27FC236}">
+                  <a16:creationId xmlns:a16="http://schemas.microsoft.com/office/drawing/2014/main" id="{C531316E-B464-B955-A7DE-4930BDEC6D82}"/>
+                </a:ext>
+              </a:extLst>
+            </p:cNvPr>
+            <p:cNvSpPr/>
+            <p:nvPr/>
+          </p:nvSpPr>
+          <p:spPr>
+            <a:xfrm>
+              <a:off x="6845527" y="2187277"/>
+              <a:ext cx="390094" cy="719795"/>
+            </a:xfrm>
+            <a:prstGeom prst="rect">
+              <a:avLst/>
+            </a:prstGeom>
+            <a:solidFill>
+              <a:schemeClr val="bg1"/>
+            </a:solidFill>
+          </p:spPr>
+          <p:style>
+            <a:lnRef idx="3">
+              <a:schemeClr val="lt1"/>
+            </a:lnRef>
+            <a:fillRef idx="1">
+              <a:schemeClr val="accent1"/>
+            </a:fillRef>
+            <a:effectRef idx="1">
+              <a:schemeClr val="accent1"/>
+            </a:effectRef>
+            <a:fontRef idx="minor">
+              <a:schemeClr val="lt1"/>
+            </a:fontRef>
+          </p:style>
+          <p:txBody>
+            <a:bodyPr rtlCol="0" anchor="ctr"/>
+            <a:lstStyle/>
+            <a:p>
+              <a:pPr algn="ctr"/>
+              <a:endParaRPr kumimoji="1" lang="zh-CN" altLang="en-US" sz="1600"/>
+            </a:p>
+          </p:txBody>
+        </p:sp>
+        <p:sp>
+          <p:nvSpPr>
+            <p:cNvPr id="34" name="TextBox 33">
+              <a:extLst>
+                <a:ext uri="{FF2B5EF4-FFF2-40B4-BE49-F238E27FC236}">
+                  <a16:creationId xmlns:a16="http://schemas.microsoft.com/office/drawing/2014/main" id="{3361996B-006C-B2C1-BD84-C15A15C84379}"/>
+                </a:ext>
+              </a:extLst>
+            </p:cNvPr>
+            <p:cNvSpPr txBox="1"/>
+            <p:nvPr/>
+          </p:nvSpPr>
+          <p:spPr>
+            <a:xfrm>
+              <a:off x="6567209" y="2179299"/>
+              <a:ext cx="367408" cy="215444"/>
+            </a:xfrm>
+            <a:prstGeom prst="rect">
+              <a:avLst/>
+            </a:prstGeom>
+            <a:noFill/>
+          </p:spPr>
+          <p:txBody>
+            <a:bodyPr wrap="none" rtlCol="0">
+              <a:spAutoFit/>
+            </a:bodyPr>
+            <a:lstStyle/>
+            <a:p>
+              <a:r>
+                <a:rPr lang="en-CN" sz="800" dirty="0"/>
+                <a:t>ALU</a:t>
+              </a:r>
+            </a:p>
+          </p:txBody>
+        </p:sp>
+      </p:grpSp>
+      <p:sp>
+        <p:nvSpPr>
+          <p:cNvPr id="39" name="右箭头 25">
+            <a:extLst>
+              <a:ext uri="{FF2B5EF4-FFF2-40B4-BE49-F238E27FC236}">
+                <a16:creationId xmlns:a16="http://schemas.microsoft.com/office/drawing/2014/main" id="{7C5B0618-3F43-E20D-81AD-936BF1567D2B}"/>
+              </a:ext>
+            </a:extLst>
+          </p:cNvPr>
+          <p:cNvSpPr/>
+          <p:nvPr/>
+        </p:nvSpPr>
+        <p:spPr>
+          <a:xfrm>
+            <a:off x="5233882" y="1464397"/>
+            <a:ext cx="1035954" cy="143801"/>
+          </a:xfrm>
+          <a:prstGeom prst="rightArrow">
+            <a:avLst/>
+          </a:prstGeom>
+          <a:solidFill>
+            <a:schemeClr val="accent1">
+              <a:lumMod val="75000"/>
+            </a:schemeClr>
+          </a:solidFill>
+        </p:spPr>
+        <p:style>
+          <a:lnRef idx="2">
+            <a:schemeClr val="accent1">
+              <a:shade val="15000"/>
+            </a:schemeClr>
+          </a:lnRef>
+          <a:fillRef idx="1">
+            <a:schemeClr val="accent1"/>
+          </a:fillRef>
+          <a:effectRef idx="0">
+            <a:schemeClr val="accent1"/>
+          </a:effectRef>
+          <a:fontRef idx="minor">
+            <a:schemeClr val="lt1"/>
+          </a:fontRef>
+        </p:style>
+        <p:txBody>
+          <a:bodyPr rtlCol="0" anchor="ctr"/>
+          <a:lstStyle/>
+          <a:p>
+            <a:pPr algn="ctr"/>
+            <a:endParaRPr kumimoji="1" lang="zh-CN" altLang="en-US" sz="1600"/>
+          </a:p>
+        </p:txBody>
+      </p:sp>
+      <p:sp>
+        <p:nvSpPr>
+          <p:cNvPr id="40" name="右箭头 25">
+            <a:extLst>
+              <a:ext uri="{FF2B5EF4-FFF2-40B4-BE49-F238E27FC236}">
+                <a16:creationId xmlns:a16="http://schemas.microsoft.com/office/drawing/2014/main" id="{30491043-3E1F-7DD4-EE39-259F2BFB6E9B}"/>
+              </a:ext>
+            </a:extLst>
+          </p:cNvPr>
+          <p:cNvSpPr/>
+          <p:nvPr/>
+        </p:nvSpPr>
+        <p:spPr>
+          <a:xfrm>
+            <a:off x="6061872" y="2128418"/>
+            <a:ext cx="212558" cy="143801"/>
+          </a:xfrm>
+          <a:prstGeom prst="rightArrow">
+            <a:avLst/>
+          </a:prstGeom>
+          <a:solidFill>
+            <a:schemeClr val="accent1">
+              <a:lumMod val="75000"/>
+            </a:schemeClr>
+          </a:solidFill>
+        </p:spPr>
+        <p:style>
+          <a:lnRef idx="2">
+            <a:schemeClr val="accent1">
+              <a:shade val="15000"/>
+            </a:schemeClr>
+          </a:lnRef>
+          <a:fillRef idx="1">
+            <a:schemeClr val="accent1"/>
+          </a:fillRef>
+          <a:effectRef idx="0">
+            <a:schemeClr val="accent1"/>
+          </a:effectRef>
+          <a:fontRef idx="minor">
+            <a:schemeClr val="lt1"/>
+          </a:fontRef>
+        </p:style>
+        <p:txBody>
+          <a:bodyPr rtlCol="0" anchor="ctr"/>
+          <a:lstStyle/>
+          <a:p>
+            <a:pPr algn="ctr"/>
+            <a:endParaRPr kumimoji="1" lang="zh-CN" altLang="en-US" sz="1600"/>
+          </a:p>
+        </p:txBody>
+      </p:sp>
+      <p:sp>
+        <p:nvSpPr>
+          <p:cNvPr id="41" name="圆角矩形 11">
+            <a:extLst>
+              <a:ext uri="{FF2B5EF4-FFF2-40B4-BE49-F238E27FC236}">
+                <a16:creationId xmlns:a16="http://schemas.microsoft.com/office/drawing/2014/main" id="{8456F169-9179-0631-914A-2E7B2CD6D95B}"/>
+              </a:ext>
+            </a:extLst>
+          </p:cNvPr>
+          <p:cNvSpPr/>
+          <p:nvPr/>
+        </p:nvSpPr>
+        <p:spPr>
+          <a:xfrm>
+            <a:off x="6845129" y="1658745"/>
+            <a:ext cx="1108286" cy="975922"/>
+          </a:xfrm>
+          <a:prstGeom prst="roundRect">
+            <a:avLst/>
+          </a:prstGeom>
+        </p:spPr>
+        <p:style>
+          <a:lnRef idx="1">
+            <a:schemeClr val="accent4"/>
+          </a:lnRef>
+          <a:fillRef idx="2">
+            <a:schemeClr val="accent4"/>
+          </a:fillRef>
+          <a:effectRef idx="1">
+            <a:schemeClr val="accent4"/>
+          </a:effectRef>
+          <a:fontRef idx="minor">
+            <a:schemeClr val="dk1"/>
+          </a:fontRef>
+        </p:style>
+        <p:txBody>
+          <a:bodyPr rtlCol="0" anchor="ctr"/>
+          <a:lstStyle/>
+          <a:p>
+            <a:pPr algn="ctr"/>
+            <a:r>
+              <a:rPr kumimoji="1" lang="en-US" altLang="zh-CN" sz="1200" dirty="0"/>
+              <a:t>RAM</a:t>
+            </a:r>
+          </a:p>
+          <a:p>
+            <a:pPr algn="ctr"/>
+            <a:r>
+              <a:rPr kumimoji="1" lang="zh-CN" altLang="en-US" sz="1200" dirty="0"/>
+              <a:t>（存储数据）</a:t>
+            </a:r>
+          </a:p>
+        </p:txBody>
+      </p:sp>
+      <p:sp>
+        <p:nvSpPr>
+          <p:cNvPr id="42" name="右箭头 25">
+            <a:extLst>
+              <a:ext uri="{FF2B5EF4-FFF2-40B4-BE49-F238E27FC236}">
+                <a16:creationId xmlns:a16="http://schemas.microsoft.com/office/drawing/2014/main" id="{1CA4C740-88F8-5911-5697-BB7524A08F6D}"/>
+              </a:ext>
+            </a:extLst>
+          </p:cNvPr>
+          <p:cNvSpPr/>
+          <p:nvPr/>
+        </p:nvSpPr>
+        <p:spPr>
+          <a:xfrm>
+            <a:off x="6598717" y="1773114"/>
+            <a:ext cx="212558" cy="143801"/>
+          </a:xfrm>
+          <a:prstGeom prst="rightArrow">
+            <a:avLst/>
+          </a:prstGeom>
+          <a:solidFill>
+            <a:schemeClr val="accent1">
+              <a:lumMod val="75000"/>
+            </a:schemeClr>
+          </a:solidFill>
+        </p:spPr>
+        <p:style>
+          <a:lnRef idx="2">
+            <a:schemeClr val="accent1">
+              <a:shade val="15000"/>
+            </a:schemeClr>
+          </a:lnRef>
+          <a:fillRef idx="1">
+            <a:schemeClr val="accent1"/>
+          </a:fillRef>
+          <a:effectRef idx="0">
+            <a:schemeClr val="accent1"/>
+          </a:effectRef>
+          <a:fontRef idx="minor">
+            <a:schemeClr val="lt1"/>
+          </a:fontRef>
+        </p:style>
+        <p:txBody>
+          <a:bodyPr rtlCol="0" anchor="ctr"/>
+          <a:lstStyle/>
+          <a:p>
+            <a:pPr algn="ctr"/>
+            <a:endParaRPr kumimoji="1" lang="zh-CN" altLang="en-US" sz="1600"/>
+          </a:p>
+        </p:txBody>
+      </p:sp>
+      <p:sp>
+        <p:nvSpPr>
+          <p:cNvPr id="43" name="圆角矩形 13">
+            <a:extLst>
+              <a:ext uri="{FF2B5EF4-FFF2-40B4-BE49-F238E27FC236}">
+                <a16:creationId xmlns:a16="http://schemas.microsoft.com/office/drawing/2014/main" id="{3D3EAFD8-469A-5EBC-6EE8-9BB5C31E18DF}"/>
+              </a:ext>
+            </a:extLst>
+          </p:cNvPr>
+          <p:cNvSpPr/>
+          <p:nvPr/>
+        </p:nvSpPr>
+        <p:spPr>
+          <a:xfrm>
+            <a:off x="8243834" y="1443815"/>
+            <a:ext cx="836168" cy="611106"/>
+          </a:xfrm>
+          <a:prstGeom prst="roundRect">
+            <a:avLst/>
+          </a:prstGeom>
+          <a:solidFill>
+            <a:schemeClr val="accent1">
+              <a:lumMod val="60000"/>
+              <a:lumOff val="40000"/>
+            </a:schemeClr>
+          </a:solidFill>
+          <a:ln>
+            <a:solidFill>
+              <a:schemeClr val="tx1"/>
+            </a:solidFill>
+          </a:ln>
+        </p:spPr>
+        <p:style>
+          <a:lnRef idx="2">
+            <a:schemeClr val="accent1">
+              <a:shade val="15000"/>
+            </a:schemeClr>
+          </a:lnRef>
+          <a:fillRef idx="1">
+            <a:schemeClr val="accent1"/>
+          </a:fillRef>
+          <a:effectRef idx="0">
+            <a:schemeClr val="accent1"/>
+          </a:effectRef>
+          <a:fontRef idx="minor">
+            <a:schemeClr val="lt1"/>
+          </a:fontRef>
+        </p:style>
+        <p:txBody>
+          <a:bodyPr rtlCol="0" anchor="ctr"/>
+          <a:lstStyle/>
+          <a:p>
+            <a:pPr algn="ctr"/>
+            <a:r>
+              <a:rPr kumimoji="1" lang="en-US" altLang="zh-CN" sz="1100" dirty="0"/>
+              <a:t>Output</a:t>
+            </a:r>
+          </a:p>
+        </p:txBody>
+      </p:sp>
+      <p:sp>
+        <p:nvSpPr>
+          <p:cNvPr id="44" name="右箭头 25">
+            <a:extLst>
+              <a:ext uri="{FF2B5EF4-FFF2-40B4-BE49-F238E27FC236}">
+                <a16:creationId xmlns:a16="http://schemas.microsoft.com/office/drawing/2014/main" id="{BAE6B9D5-FF4C-8041-24CD-D234EFA8CC1B}"/>
+              </a:ext>
+            </a:extLst>
+          </p:cNvPr>
+          <p:cNvSpPr/>
+          <p:nvPr/>
+        </p:nvSpPr>
+        <p:spPr>
+          <a:xfrm>
+            <a:off x="7987269" y="1750191"/>
+            <a:ext cx="212558" cy="143801"/>
+          </a:xfrm>
+          <a:prstGeom prst="rightArrow">
+            <a:avLst/>
+          </a:prstGeom>
+          <a:solidFill>
+            <a:schemeClr val="accent1">
+              <a:lumMod val="75000"/>
+            </a:schemeClr>
+          </a:solidFill>
+        </p:spPr>
+        <p:style>
+          <a:lnRef idx="2">
+            <a:schemeClr val="accent1">
+              <a:shade val="15000"/>
+            </a:schemeClr>
+          </a:lnRef>
+          <a:fillRef idx="1">
+            <a:schemeClr val="accent1"/>
+          </a:fillRef>
+          <a:effectRef idx="0">
+            <a:schemeClr val="accent1"/>
+          </a:effectRef>
+          <a:fontRef idx="minor">
+            <a:schemeClr val="lt1"/>
+          </a:fontRef>
+        </p:style>
+        <p:txBody>
+          <a:bodyPr rtlCol="0" anchor="ctr"/>
+          <a:lstStyle/>
+          <a:p>
+            <a:pPr algn="ctr"/>
+            <a:endParaRPr kumimoji="1" lang="zh-CN" altLang="en-US" sz="1600"/>
+          </a:p>
+        </p:txBody>
+      </p:sp>
+      <p:cxnSp>
+        <p:nvCxnSpPr>
+          <p:cNvPr id="47" name="Elbow Connector 46">
+            <a:extLst>
+              <a:ext uri="{FF2B5EF4-FFF2-40B4-BE49-F238E27FC236}">
+                <a16:creationId xmlns:a16="http://schemas.microsoft.com/office/drawing/2014/main" id="{821379E5-49EC-F088-2674-34952A9C768D}"/>
+              </a:ext>
+            </a:extLst>
+          </p:cNvPr>
+          <p:cNvCxnSpPr>
+            <a:stCxn id="42" idx="0"/>
+          </p:cNvCxnSpPr>
+          <p:nvPr/>
+        </p:nvCxnSpPr>
+        <p:spPr>
+          <a:xfrm rot="5400000" flipH="1" flipV="1">
+            <a:off x="7386756" y="960043"/>
+            <a:ext cx="165691" cy="1460452"/>
+          </a:xfrm>
+          <a:prstGeom prst="bentConnector2">
+            <a:avLst/>
+          </a:prstGeom>
+          <a:ln>
+            <a:tailEnd type="triangle"/>
+          </a:ln>
+        </p:spPr>
+        <p:style>
+          <a:lnRef idx="1">
+            <a:schemeClr val="accent1"/>
+          </a:lnRef>
+          <a:fillRef idx="0">
+            <a:schemeClr val="accent1"/>
+          </a:fillRef>
+          <a:effectRef idx="0">
+            <a:schemeClr val="accent1"/>
+          </a:effectRef>
+          <a:fontRef idx="minor">
+            <a:schemeClr val="tx1"/>
+          </a:fontRef>
+        </p:style>
+      </p:cxnSp>
+    </p:spTree>
+    <p:extLst>
+      <p:ext uri="{BB962C8B-B14F-4D97-AF65-F5344CB8AC3E}">
+        <p14:creationId xmlns:p14="http://schemas.microsoft.com/office/powerpoint/2010/main" val="2452836750"/>
+      </p:ext>
+    </p:extLst>
+  </p:cSld>
+  <p:clrMapOvr>
+    <a:masterClrMapping/>
+  </p:clrMapOvr>
+</p:sld>
+</file>
+
 <file path=ppt/theme/theme1.xml><?xml version="1.0" encoding="utf-8"?>
 <a:theme xmlns:a="http://schemas.openxmlformats.org/drawingml/2006/main" name="Office 主题​​">
   <a:themeElements>

</xml_diff>